<commit_message>
mise à jour de la date
</commit_message>
<xml_diff>
--- a/doc/Soutenance Projet 6.pptx
+++ b/doc/Soutenance Projet 6.pptx
@@ -302,7 +302,7 @@
           <a:p>
             <a:fld id="{2400229A-390B-4886-878D-DF4DFBA38E23}" type="datetimeFigureOut">
               <a:rPr lang="fr-FR" smtClean="0"/>
-              <a:t>25/02/2019</a:t>
+              <a:t>26/02/2019</a:t>
             </a:fld>
             <a:endParaRPr lang="fr-FR"/>
           </a:p>
@@ -467,7 +467,7 @@
           <a:p>
             <a:fld id="{2400229A-390B-4886-878D-DF4DFBA38E23}" type="datetimeFigureOut">
               <a:rPr lang="fr-FR" smtClean="0"/>
-              <a:t>25/02/2019</a:t>
+              <a:t>26/02/2019</a:t>
             </a:fld>
             <a:endParaRPr lang="fr-FR"/>
           </a:p>
@@ -642,7 +642,7 @@
           <a:p>
             <a:fld id="{2400229A-390B-4886-878D-DF4DFBA38E23}" type="datetimeFigureOut">
               <a:rPr lang="fr-FR" smtClean="0"/>
-              <a:t>25/02/2019</a:t>
+              <a:t>26/02/2019</a:t>
             </a:fld>
             <a:endParaRPr lang="fr-FR"/>
           </a:p>
@@ -807,7 +807,7 @@
           <a:p>
             <a:fld id="{2400229A-390B-4886-878D-DF4DFBA38E23}" type="datetimeFigureOut">
               <a:rPr lang="fr-FR" smtClean="0"/>
-              <a:t>25/02/2019</a:t>
+              <a:t>26/02/2019</a:t>
             </a:fld>
             <a:endParaRPr lang="fr-FR"/>
           </a:p>
@@ -1048,7 +1048,7 @@
           <a:p>
             <a:fld id="{2400229A-390B-4886-878D-DF4DFBA38E23}" type="datetimeFigureOut">
               <a:rPr lang="fr-FR" smtClean="0"/>
-              <a:t>25/02/2019</a:t>
+              <a:t>26/02/2019</a:t>
             </a:fld>
             <a:endParaRPr lang="fr-FR"/>
           </a:p>
@@ -1331,7 +1331,7 @@
           <a:p>
             <a:fld id="{2400229A-390B-4886-878D-DF4DFBA38E23}" type="datetimeFigureOut">
               <a:rPr lang="fr-FR" smtClean="0"/>
-              <a:t>25/02/2019</a:t>
+              <a:t>26/02/2019</a:t>
             </a:fld>
             <a:endParaRPr lang="fr-FR"/>
           </a:p>
@@ -1760,7 +1760,7 @@
           <a:p>
             <a:fld id="{2400229A-390B-4886-878D-DF4DFBA38E23}" type="datetimeFigureOut">
               <a:rPr lang="fr-FR" smtClean="0"/>
-              <a:t>25/02/2019</a:t>
+              <a:t>26/02/2019</a:t>
             </a:fld>
             <a:endParaRPr lang="fr-FR"/>
           </a:p>
@@ -1873,7 +1873,7 @@
           <a:p>
             <a:fld id="{2400229A-390B-4886-878D-DF4DFBA38E23}" type="datetimeFigureOut">
               <a:rPr lang="fr-FR" smtClean="0"/>
-              <a:t>25/02/2019</a:t>
+              <a:t>26/02/2019</a:t>
             </a:fld>
             <a:endParaRPr lang="fr-FR"/>
           </a:p>
@@ -1963,7 +1963,7 @@
           <a:p>
             <a:fld id="{2400229A-390B-4886-878D-DF4DFBA38E23}" type="datetimeFigureOut">
               <a:rPr lang="fr-FR" smtClean="0"/>
-              <a:t>25/02/2019</a:t>
+              <a:t>26/02/2019</a:t>
             </a:fld>
             <a:endParaRPr lang="fr-FR"/>
           </a:p>
@@ -2152,7 +2152,7 @@
           <a:p>
             <a:fld id="{2400229A-390B-4886-878D-DF4DFBA38E23}" type="datetimeFigureOut">
               <a:rPr lang="fr-FR" smtClean="0"/>
-              <a:t>25/02/2019</a:t>
+              <a:t>26/02/2019</a:t>
             </a:fld>
             <a:endParaRPr lang="fr-FR"/>
           </a:p>
@@ -2470,7 +2470,7 @@
           <a:p>
             <a:fld id="{2400229A-390B-4886-878D-DF4DFBA38E23}" type="datetimeFigureOut">
               <a:rPr lang="fr-FR" smtClean="0"/>
-              <a:t>25/02/2019</a:t>
+              <a:t>26/02/2019</a:t>
             </a:fld>
             <a:endParaRPr lang="fr-FR"/>
           </a:p>
@@ -2849,7 +2849,7 @@
           <a:p>
             <a:fld id="{2400229A-390B-4886-878D-DF4DFBA38E23}" type="datetimeFigureOut">
               <a:rPr lang="fr-FR" smtClean="0"/>
-              <a:t>25/02/2019</a:t>
+              <a:t>26/02/2019</a:t>
             </a:fld>
             <a:endParaRPr lang="fr-FR"/>
           </a:p>
@@ -3189,11 +3189,7 @@
           <a:p>
             <a:r>
               <a:rPr lang="fr-FR" dirty="0" smtClean="0"/>
-              <a:t>Soutenance Projet </a:t>
-            </a:r>
-            <a:r>
-              <a:rPr lang="fr-FR" dirty="0" smtClean="0"/>
-              <a:t>6</a:t>
+              <a:t>Soutenance Projet 6</a:t>
             </a:r>
             <a:endParaRPr lang="fr-FR" dirty="0"/>
           </a:p>
@@ -3232,8 +3228,12 @@
           </a:p>
           <a:p>
             <a:r>
-              <a:rPr lang="fr-FR" sz="2400" dirty="0" smtClean="0"/>
-              <a:t>xx/03/2019</a:t>
+              <a:rPr lang="fr-FR" sz="2400" smtClean="0"/>
+              <a:t>06</a:t>
+            </a:r>
+            <a:r>
+              <a:rPr lang="fr-FR" sz="2400" smtClean="0"/>
+              <a:t>/03/2019</a:t>
             </a:r>
             <a:endParaRPr lang="fr-FR" sz="2400" dirty="0"/>
           </a:p>

</xml_diff>